<commit_message>
MAJ 24/01/2018 Signed-off-by: DrBlaf <chauveau.aurelien.76@gmail.com>
</commit_message>
<xml_diff>
--- a/Rapport/Projet_Domotique_présentation.pptx
+++ b/Rapport/Projet_Domotique_présentation.pptx
@@ -13,7 +13,11 @@
     <p:sldId id="261" r:id="rId7"/>
     <p:sldId id="262" r:id="rId8"/>
     <p:sldId id="263" r:id="rId9"/>
-    <p:sldId id="264" r:id="rId10"/>
+    <p:sldId id="266" r:id="rId10"/>
+    <p:sldId id="267" r:id="rId11"/>
+    <p:sldId id="268" r:id="rId12"/>
+    <p:sldId id="264" r:id="rId13"/>
+    <p:sldId id="265" r:id="rId14"/>
   </p:sldIdLst>
   <p:sldSz cx="9144000" cy="6858000" type="screen4x3"/>
   <p:notesSz cx="6858000" cy="9144000"/>
@@ -499,7 +503,8 @@
           <a:p>
             <a:fld id="{7385B5F2-299D-41E4-81B4-55AECBC730DC}" type="datetimeFigureOut">
               <a:rPr lang="fr-FR" smtClean="0"/>
-              <a:t>23/01/2018</a:t>
+              <a:pPr/>
+              <a:t>24/01/2018</a:t>
             </a:fld>
             <a:endParaRPr lang="fr-FR"/>
           </a:p>
@@ -541,6 +546,7 @@
           <a:p>
             <a:fld id="{7D3A4F89-43D3-49E1-8303-387E1D1B5F0A}" type="slidenum">
               <a:rPr lang="fr-FR" smtClean="0"/>
+              <a:pPr/>
               <a:t>‹N°›</a:t>
             </a:fld>
             <a:endParaRPr lang="fr-FR"/>
@@ -664,7 +670,8 @@
           <a:p>
             <a:fld id="{7385B5F2-299D-41E4-81B4-55AECBC730DC}" type="datetimeFigureOut">
               <a:rPr lang="fr-FR" smtClean="0"/>
-              <a:t>23/01/2018</a:t>
+              <a:pPr/>
+              <a:t>24/01/2018</a:t>
             </a:fld>
             <a:endParaRPr lang="fr-FR"/>
           </a:p>
@@ -706,6 +713,7 @@
           <a:p>
             <a:fld id="{7D3A4F89-43D3-49E1-8303-387E1D1B5F0A}" type="slidenum">
               <a:rPr lang="fr-FR" smtClean="0"/>
+              <a:pPr/>
               <a:t>‹N°›</a:t>
             </a:fld>
             <a:endParaRPr lang="fr-FR"/>
@@ -839,7 +847,8 @@
           <a:p>
             <a:fld id="{7385B5F2-299D-41E4-81B4-55AECBC730DC}" type="datetimeFigureOut">
               <a:rPr lang="fr-FR" smtClean="0"/>
-              <a:t>23/01/2018</a:t>
+              <a:pPr/>
+              <a:t>24/01/2018</a:t>
             </a:fld>
             <a:endParaRPr lang="fr-FR"/>
           </a:p>
@@ -881,6 +890,7 @@
           <a:p>
             <a:fld id="{7D3A4F89-43D3-49E1-8303-387E1D1B5F0A}" type="slidenum">
               <a:rPr lang="fr-FR" smtClean="0"/>
+              <a:pPr/>
               <a:t>‹N°›</a:t>
             </a:fld>
             <a:endParaRPr lang="fr-FR"/>
@@ -1008,7 +1018,8 @@
           <a:p>
             <a:fld id="{7385B5F2-299D-41E4-81B4-55AECBC730DC}" type="datetimeFigureOut">
               <a:rPr lang="fr-FR" smtClean="0"/>
-              <a:t>23/01/2018</a:t>
+              <a:pPr/>
+              <a:t>24/01/2018</a:t>
             </a:fld>
             <a:endParaRPr lang="fr-FR"/>
           </a:p>
@@ -1050,6 +1061,7 @@
           <a:p>
             <a:fld id="{7D3A4F89-43D3-49E1-8303-387E1D1B5F0A}" type="slidenum">
               <a:rPr lang="fr-FR" smtClean="0"/>
+              <a:pPr/>
               <a:t>‹N°›</a:t>
             </a:fld>
             <a:endParaRPr lang="fr-FR"/>
@@ -1463,7 +1475,8 @@
           <a:p>
             <a:fld id="{7385B5F2-299D-41E4-81B4-55AECBC730DC}" type="datetimeFigureOut">
               <a:rPr lang="fr-FR" smtClean="0"/>
-              <a:t>23/01/2018</a:t>
+              <a:pPr/>
+              <a:t>24/01/2018</a:t>
             </a:fld>
             <a:endParaRPr lang="fr-FR"/>
           </a:p>
@@ -1505,6 +1518,7 @@
           <a:p>
             <a:fld id="{7D3A4F89-43D3-49E1-8303-387E1D1B5F0A}" type="slidenum">
               <a:rPr lang="fr-FR" smtClean="0"/>
+              <a:pPr/>
               <a:t>‹N°›</a:t>
             </a:fld>
             <a:endParaRPr lang="fr-FR"/>
@@ -1727,7 +1741,8 @@
           <a:p>
             <a:fld id="{7385B5F2-299D-41E4-81B4-55AECBC730DC}" type="datetimeFigureOut">
               <a:rPr lang="fr-FR" smtClean="0"/>
-              <a:t>23/01/2018</a:t>
+              <a:pPr/>
+              <a:t>24/01/2018</a:t>
             </a:fld>
             <a:endParaRPr lang="fr-FR"/>
           </a:p>
@@ -1769,6 +1784,7 @@
           <a:p>
             <a:fld id="{7D3A4F89-43D3-49E1-8303-387E1D1B5F0A}" type="slidenum">
               <a:rPr lang="fr-FR" smtClean="0"/>
+              <a:pPr/>
               <a:t>‹N°›</a:t>
             </a:fld>
             <a:endParaRPr lang="fr-FR"/>
@@ -2101,7 +2117,8 @@
           <a:p>
             <a:fld id="{7385B5F2-299D-41E4-81B4-55AECBC730DC}" type="datetimeFigureOut">
               <a:rPr lang="fr-FR" smtClean="0"/>
-              <a:t>23/01/2018</a:t>
+              <a:pPr/>
+              <a:t>24/01/2018</a:t>
             </a:fld>
             <a:endParaRPr lang="fr-FR"/>
           </a:p>
@@ -2143,6 +2160,7 @@
           <a:p>
             <a:fld id="{7D3A4F89-43D3-49E1-8303-387E1D1B5F0A}" type="slidenum">
               <a:rPr lang="fr-FR" smtClean="0"/>
+              <a:pPr/>
               <a:t>‹N°›</a:t>
             </a:fld>
             <a:endParaRPr lang="fr-FR"/>
@@ -2223,7 +2241,8 @@
           <a:p>
             <a:fld id="{7385B5F2-299D-41E4-81B4-55AECBC730DC}" type="datetimeFigureOut">
               <a:rPr lang="fr-FR" smtClean="0"/>
-              <a:t>23/01/2018</a:t>
+              <a:pPr/>
+              <a:t>24/01/2018</a:t>
             </a:fld>
             <a:endParaRPr lang="fr-FR"/>
           </a:p>
@@ -2246,6 +2265,7 @@
           <a:p>
             <a:fld id="{7D3A4F89-43D3-49E1-8303-387E1D1B5F0A}" type="slidenum">
               <a:rPr lang="fr-FR" smtClean="0"/>
+              <a:pPr/>
               <a:t>‹N°›</a:t>
             </a:fld>
             <a:endParaRPr lang="fr-FR"/>
@@ -2313,7 +2333,8 @@
           <a:p>
             <a:fld id="{7385B5F2-299D-41E4-81B4-55AECBC730DC}" type="datetimeFigureOut">
               <a:rPr lang="fr-FR" smtClean="0"/>
-              <a:t>23/01/2018</a:t>
+              <a:pPr/>
+              <a:t>24/01/2018</a:t>
             </a:fld>
             <a:endParaRPr lang="fr-FR"/>
           </a:p>
@@ -2355,6 +2376,7 @@
           <a:p>
             <a:fld id="{7D3A4F89-43D3-49E1-8303-387E1D1B5F0A}" type="slidenum">
               <a:rPr lang="fr-FR" smtClean="0"/>
+              <a:pPr/>
               <a:t>‹N°›</a:t>
             </a:fld>
             <a:endParaRPr lang="fr-FR"/>
@@ -2562,7 +2584,8 @@
           <a:p>
             <a:fld id="{7385B5F2-299D-41E4-81B4-55AECBC730DC}" type="datetimeFigureOut">
               <a:rPr lang="fr-FR" smtClean="0"/>
-              <a:t>23/01/2018</a:t>
+              <a:pPr/>
+              <a:t>24/01/2018</a:t>
             </a:fld>
             <a:endParaRPr lang="fr-FR"/>
           </a:p>
@@ -2609,6 +2632,7 @@
           <a:p>
             <a:fld id="{7D3A4F89-43D3-49E1-8303-387E1D1B5F0A}" type="slidenum">
               <a:rPr lang="fr-FR" smtClean="0"/>
+              <a:pPr/>
               <a:t>‹N°›</a:t>
             </a:fld>
             <a:endParaRPr lang="fr-FR"/>
@@ -2821,7 +2845,8 @@
           <a:p>
             <a:fld id="{7385B5F2-299D-41E4-81B4-55AECBC730DC}" type="datetimeFigureOut">
               <a:rPr lang="fr-FR" smtClean="0"/>
-              <a:t>23/01/2018</a:t>
+              <a:pPr/>
+              <a:t>24/01/2018</a:t>
             </a:fld>
             <a:endParaRPr lang="fr-FR"/>
           </a:p>
@@ -2863,6 +2888,7 @@
           <a:p>
             <a:fld id="{7D3A4F89-43D3-49E1-8303-387E1D1B5F0A}" type="slidenum">
               <a:rPr lang="fr-FR" smtClean="0"/>
+              <a:pPr/>
               <a:t>‹N°›</a:t>
             </a:fld>
             <a:endParaRPr lang="fr-FR"/>
@@ -3225,7 +3251,8 @@
           <a:p>
             <a:fld id="{7385B5F2-299D-41E4-81B4-55AECBC730DC}" type="datetimeFigureOut">
               <a:rPr lang="fr-FR" smtClean="0"/>
-              <a:t>23/01/2018</a:t>
+              <a:pPr/>
+              <a:t>24/01/2018</a:t>
             </a:fld>
             <a:endParaRPr lang="fr-FR"/>
           </a:p>
@@ -3303,6 +3330,7 @@
           <a:p>
             <a:fld id="{7D3A4F89-43D3-49E1-8303-387E1D1B5F0A}" type="slidenum">
               <a:rPr lang="fr-FR" smtClean="0"/>
+              <a:pPr/>
               <a:t>‹N°›</a:t>
             </a:fld>
             <a:endParaRPr lang="fr-FR"/>
@@ -3679,6 +3707,715 @@
 </p:sld>
 </file>
 
+<file path=ppt/slides/slide10.xml><?xml version="1.0" encoding="utf-8"?>
+<p:sld xmlns:a="http://schemas.openxmlformats.org/drawingml/2006/main" xmlns:r="http://schemas.openxmlformats.org/officeDocument/2006/relationships" xmlns:p="http://schemas.openxmlformats.org/presentationml/2006/main">
+  <p:cSld>
+    <p:spTree>
+      <p:nvGrpSpPr>
+        <p:cNvPr id="1" name=""/>
+        <p:cNvGrpSpPr/>
+        <p:nvPr/>
+      </p:nvGrpSpPr>
+      <p:grpSpPr>
+        <a:xfrm>
+          <a:off x="0" y="0"/>
+          <a:ext cx="0" cy="0"/>
+          <a:chOff x="0" y="0"/>
+          <a:chExt cx="0" cy="0"/>
+        </a:xfrm>
+      </p:grpSpPr>
+      <p:sp>
+        <p:nvSpPr>
+          <p:cNvPr id="2" name="Titre 1"/>
+          <p:cNvSpPr>
+            <a:spLocks noGrp="1"/>
+          </p:cNvSpPr>
+          <p:nvPr>
+            <p:ph type="title"/>
+          </p:nvPr>
+        </p:nvSpPr>
+        <p:spPr/>
+        <p:txBody>
+          <a:bodyPr/>
+          <a:lstStyle/>
+          <a:p>
+            <a:r>
+              <a:rPr lang="fr-FR" dirty="0" smtClean="0">
+                <a:ln w="18415" cmpd="sng">
+                  <a:solidFill>
+                    <a:srgbClr val="FFFFFF"/>
+                  </a:solidFill>
+                  <a:prstDash val="solid"/>
+                </a:ln>
+                <a:solidFill>
+                  <a:srgbClr val="FFFFFF"/>
+                </a:solidFill>
+                <a:effectLst>
+                  <a:outerShdw blurRad="63500" dir="3600000" algn="tl" rotWithShape="0">
+                    <a:srgbClr val="000000">
+                      <a:alpha val="70000"/>
+                    </a:srgbClr>
+                  </a:outerShdw>
+                </a:effectLst>
+              </a:rPr>
+              <a:t>Scénario d’application</a:t>
+            </a:r>
+            <a:endParaRPr lang="fr-FR" dirty="0"/>
+          </a:p>
+        </p:txBody>
+      </p:sp>
+      <p:pic>
+        <p:nvPicPr>
+          <p:cNvPr id="3074" name="Picture 2"/>
+          <p:cNvPicPr>
+            <a:picLocks noChangeAspect="1" noChangeArrowheads="1"/>
+          </p:cNvPicPr>
+          <p:nvPr/>
+        </p:nvPicPr>
+        <p:blipFill>
+          <a:blip r:embed="rId2"/>
+          <a:srcRect/>
+          <a:stretch>
+            <a:fillRect/>
+          </a:stretch>
+        </p:blipFill>
+        <p:spPr bwMode="auto">
+          <a:xfrm>
+            <a:off x="1002028" y="2071678"/>
+            <a:ext cx="7139944" cy="3338520"/>
+          </a:xfrm>
+          <a:prstGeom prst="rect">
+            <a:avLst/>
+          </a:prstGeom>
+          <a:ln w="38100" cap="sq">
+            <a:solidFill>
+              <a:schemeClr val="accent2"/>
+            </a:solidFill>
+            <a:prstDash val="solid"/>
+            <a:miter lim="800000"/>
+          </a:ln>
+          <a:effectLst>
+            <a:outerShdw blurRad="50800" dist="38100" dir="2700000" algn="tl" rotWithShape="0">
+              <a:srgbClr val="000000">
+                <a:alpha val="43000"/>
+              </a:srgbClr>
+            </a:outerShdw>
+          </a:effectLst>
+        </p:spPr>
+      </p:pic>
+    </p:spTree>
+  </p:cSld>
+  <p:clrMapOvr>
+    <a:masterClrMapping/>
+  </p:clrMapOvr>
+</p:sld>
+</file>
+
+<file path=ppt/slides/slide11.xml><?xml version="1.0" encoding="utf-8"?>
+<p:sld xmlns:a="http://schemas.openxmlformats.org/drawingml/2006/main" xmlns:r="http://schemas.openxmlformats.org/officeDocument/2006/relationships" xmlns:p="http://schemas.openxmlformats.org/presentationml/2006/main">
+  <p:cSld>
+    <p:spTree>
+      <p:nvGrpSpPr>
+        <p:cNvPr id="1" name=""/>
+        <p:cNvGrpSpPr/>
+        <p:nvPr/>
+      </p:nvGrpSpPr>
+      <p:grpSpPr>
+        <a:xfrm>
+          <a:off x="0" y="0"/>
+          <a:ext cx="0" cy="0"/>
+          <a:chOff x="0" y="0"/>
+          <a:chExt cx="0" cy="0"/>
+        </a:xfrm>
+      </p:grpSpPr>
+      <p:sp>
+        <p:nvSpPr>
+          <p:cNvPr id="2" name="Titre 1"/>
+          <p:cNvSpPr>
+            <a:spLocks noGrp="1"/>
+          </p:cNvSpPr>
+          <p:nvPr>
+            <p:ph type="title"/>
+          </p:nvPr>
+        </p:nvSpPr>
+        <p:spPr/>
+        <p:txBody>
+          <a:bodyPr/>
+          <a:lstStyle/>
+          <a:p>
+            <a:r>
+              <a:rPr lang="fr-FR" dirty="0" smtClean="0">
+                <a:ln w="18415" cmpd="sng">
+                  <a:solidFill>
+                    <a:srgbClr val="FFFFFF"/>
+                  </a:solidFill>
+                  <a:prstDash val="solid"/>
+                </a:ln>
+                <a:solidFill>
+                  <a:srgbClr val="FFFFFF"/>
+                </a:solidFill>
+                <a:effectLst>
+                  <a:outerShdw blurRad="63500" dir="3600000" algn="tl" rotWithShape="0">
+                    <a:srgbClr val="000000">
+                      <a:alpha val="70000"/>
+                    </a:srgbClr>
+                  </a:outerShdw>
+                </a:effectLst>
+              </a:rPr>
+              <a:t>Scénario centrale de gestion</a:t>
+            </a:r>
+            <a:endParaRPr lang="fr-FR" dirty="0">
+              <a:ln w="18415" cmpd="sng">
+                <a:solidFill>
+                  <a:srgbClr val="FFFFFF"/>
+                </a:solidFill>
+                <a:prstDash val="solid"/>
+              </a:ln>
+              <a:solidFill>
+                <a:srgbClr val="FFFFFF"/>
+              </a:solidFill>
+              <a:effectLst>
+                <a:outerShdw blurRad="63500" dir="3600000" algn="tl" rotWithShape="0">
+                  <a:srgbClr val="000000">
+                    <a:alpha val="70000"/>
+                  </a:srgbClr>
+                </a:outerShdw>
+              </a:effectLst>
+            </a:endParaRPr>
+          </a:p>
+        </p:txBody>
+      </p:sp>
+      <p:pic>
+        <p:nvPicPr>
+          <p:cNvPr id="4099" name="Picture 3"/>
+          <p:cNvPicPr>
+            <a:picLocks noChangeAspect="1" noChangeArrowheads="1"/>
+          </p:cNvPicPr>
+          <p:nvPr/>
+        </p:nvPicPr>
+        <p:blipFill>
+          <a:blip r:embed="rId2"/>
+          <a:srcRect/>
+          <a:stretch>
+            <a:fillRect/>
+          </a:stretch>
+        </p:blipFill>
+        <p:spPr bwMode="auto">
+          <a:xfrm>
+            <a:off x="1157280" y="2357430"/>
+            <a:ext cx="6829440" cy="2837054"/>
+          </a:xfrm>
+          <a:prstGeom prst="rect">
+            <a:avLst/>
+          </a:prstGeom>
+          <a:ln w="38100" cap="sq">
+            <a:solidFill>
+              <a:schemeClr val="accent2"/>
+            </a:solidFill>
+            <a:prstDash val="solid"/>
+            <a:miter lim="800000"/>
+          </a:ln>
+          <a:effectLst>
+            <a:outerShdw blurRad="50800" dist="38100" dir="2700000" algn="tl" rotWithShape="0">
+              <a:srgbClr val="000000">
+                <a:alpha val="43000"/>
+              </a:srgbClr>
+            </a:outerShdw>
+          </a:effectLst>
+        </p:spPr>
+      </p:pic>
+    </p:spTree>
+  </p:cSld>
+  <p:clrMapOvr>
+    <a:masterClrMapping/>
+  </p:clrMapOvr>
+</p:sld>
+</file>
+
+<file path=ppt/slides/slide12.xml><?xml version="1.0" encoding="utf-8"?>
+<p:sld xmlns:a="http://schemas.openxmlformats.org/drawingml/2006/main" xmlns:r="http://schemas.openxmlformats.org/officeDocument/2006/relationships" xmlns:p="http://schemas.openxmlformats.org/presentationml/2006/main">
+  <p:cSld>
+    <p:spTree>
+      <p:nvGrpSpPr>
+        <p:cNvPr id="1" name=""/>
+        <p:cNvGrpSpPr/>
+        <p:nvPr/>
+      </p:nvGrpSpPr>
+      <p:grpSpPr>
+        <a:xfrm>
+          <a:off x="0" y="0"/>
+          <a:ext cx="0" cy="0"/>
+          <a:chOff x="0" y="0"/>
+          <a:chExt cx="0" cy="0"/>
+        </a:xfrm>
+      </p:grpSpPr>
+      <p:sp>
+        <p:nvSpPr>
+          <p:cNvPr id="2" name="Titre 1"/>
+          <p:cNvSpPr>
+            <a:spLocks noGrp="1"/>
+          </p:cNvSpPr>
+          <p:nvPr>
+            <p:ph type="title"/>
+          </p:nvPr>
+        </p:nvSpPr>
+        <p:spPr/>
+        <p:txBody>
+          <a:bodyPr/>
+          <a:lstStyle/>
+          <a:p>
+            <a:r>
+              <a:rPr lang="fr-FR" dirty="0" smtClean="0">
+                <a:ln w="18415" cmpd="sng">
+                  <a:solidFill>
+                    <a:srgbClr val="FFFFFF"/>
+                  </a:solidFill>
+                  <a:prstDash val="solid"/>
+                </a:ln>
+                <a:solidFill>
+                  <a:srgbClr val="FFFFFF"/>
+                </a:solidFill>
+                <a:effectLst>
+                  <a:outerShdw blurRad="63500" dir="3600000" algn="tl" rotWithShape="0">
+                    <a:srgbClr val="000000">
+                      <a:alpha val="70000"/>
+                    </a:srgbClr>
+                  </a:outerShdw>
+                </a:effectLst>
+              </a:rPr>
+              <a:t>Les protocoles</a:t>
+            </a:r>
+            <a:endParaRPr lang="fr-FR" dirty="0">
+              <a:ln w="18415" cmpd="sng">
+                <a:solidFill>
+                  <a:srgbClr val="FFFFFF"/>
+                </a:solidFill>
+                <a:prstDash val="solid"/>
+              </a:ln>
+              <a:solidFill>
+                <a:srgbClr val="FFFFFF"/>
+              </a:solidFill>
+              <a:effectLst>
+                <a:outerShdw blurRad="63500" dir="3600000" algn="tl" rotWithShape="0">
+                  <a:srgbClr val="000000">
+                    <a:alpha val="70000"/>
+                  </a:srgbClr>
+                </a:outerShdw>
+              </a:effectLst>
+            </a:endParaRPr>
+          </a:p>
+        </p:txBody>
+      </p:sp>
+      <p:sp>
+        <p:nvSpPr>
+          <p:cNvPr id="4" name="ZoneTexte 3"/>
+          <p:cNvSpPr txBox="1"/>
+          <p:nvPr/>
+        </p:nvSpPr>
+        <p:spPr>
+          <a:xfrm>
+            <a:off x="892943" y="2214554"/>
+            <a:ext cx="7358114" cy="3416320"/>
+          </a:xfrm>
+          <a:prstGeom prst="rect">
+            <a:avLst/>
+          </a:prstGeom>
+          <a:noFill/>
+        </p:spPr>
+        <p:txBody>
+          <a:bodyPr wrap="square" rtlCol="0">
+            <a:spAutoFit/>
+          </a:bodyPr>
+          <a:lstStyle/>
+          <a:p>
+            <a:pPr>
+              <a:buFont typeface="Wingdings" pitchFamily="2" charset="2"/>
+              <a:buChar char="v"/>
+            </a:pPr>
+            <a:r>
+              <a:rPr lang="fr-FR" sz="2400" dirty="0" smtClean="0">
+                <a:ln>
+                  <a:solidFill>
+                    <a:schemeClr val="bg2"/>
+                  </a:solidFill>
+                </a:ln>
+              </a:rPr>
+              <a:t>$</a:t>
+            </a:r>
+            <a:r>
+              <a:rPr lang="fr-FR" sz="2400" dirty="0" err="1" smtClean="0">
+                <a:ln>
+                  <a:solidFill>
+                    <a:schemeClr val="bg2"/>
+                  </a:solidFill>
+                </a:ln>
+              </a:rPr>
+              <a:t>lum</a:t>
+            </a:r>
+            <a:r>
+              <a:rPr lang="fr-FR" sz="2400" dirty="0" smtClean="0">
+                <a:ln>
+                  <a:solidFill>
+                    <a:schemeClr val="bg2"/>
+                  </a:solidFill>
+                </a:ln>
+              </a:rPr>
+              <a:t>(</a:t>
+            </a:r>
+            <a:r>
+              <a:rPr lang="fr-FR" sz="2400" dirty="0" err="1" smtClean="0">
+                <a:ln>
+                  <a:solidFill>
+                    <a:schemeClr val="bg2"/>
+                  </a:solidFill>
+                </a:ln>
+              </a:rPr>
+              <a:t>bool</a:t>
+            </a:r>
+            <a:r>
+              <a:rPr lang="fr-FR" sz="2400" dirty="0" smtClean="0">
+                <a:ln>
+                  <a:solidFill>
+                    <a:schemeClr val="bg2"/>
+                  </a:solidFill>
+                </a:ln>
+              </a:rPr>
+              <a:t>)				5sec</a:t>
+            </a:r>
+          </a:p>
+          <a:p>
+            <a:pPr>
+              <a:buFont typeface="Wingdings" pitchFamily="2" charset="2"/>
+              <a:buChar char="v"/>
+            </a:pPr>
+            <a:r>
+              <a:rPr lang="fr-FR" sz="2400" dirty="0" smtClean="0">
+                <a:ln>
+                  <a:solidFill>
+                    <a:schemeClr val="bg2"/>
+                  </a:solidFill>
+                </a:ln>
+              </a:rPr>
+              <a:t>$rad(</a:t>
+            </a:r>
+            <a:r>
+              <a:rPr lang="fr-FR" sz="2400" dirty="0" err="1" smtClean="0">
+                <a:ln>
+                  <a:solidFill>
+                    <a:schemeClr val="bg2"/>
+                  </a:solidFill>
+                </a:ln>
+              </a:rPr>
+              <a:t>bool</a:t>
+            </a:r>
+            <a:r>
+              <a:rPr lang="fr-FR" sz="2400" dirty="0" smtClean="0">
+                <a:ln>
+                  <a:solidFill>
+                    <a:schemeClr val="bg2"/>
+                  </a:solidFill>
+                </a:ln>
+              </a:rPr>
+              <a:t>)				5sec</a:t>
+            </a:r>
+          </a:p>
+          <a:p>
+            <a:pPr>
+              <a:buFont typeface="Wingdings" pitchFamily="2" charset="2"/>
+              <a:buChar char="v"/>
+            </a:pPr>
+            <a:r>
+              <a:rPr lang="fr-FR" sz="2400" dirty="0" smtClean="0">
+                <a:ln>
+                  <a:solidFill>
+                    <a:schemeClr val="bg2"/>
+                  </a:solidFill>
+                </a:ln>
+              </a:rPr>
+              <a:t>$vol(</a:t>
+            </a:r>
+            <a:r>
+              <a:rPr lang="fr-FR" sz="2400" dirty="0" err="1" smtClean="0">
+                <a:ln>
+                  <a:solidFill>
+                    <a:schemeClr val="bg2"/>
+                  </a:solidFill>
+                </a:ln>
+              </a:rPr>
+              <a:t>bool</a:t>
+            </a:r>
+            <a:r>
+              <a:rPr lang="fr-FR" sz="2400" dirty="0" smtClean="0">
+                <a:ln>
+                  <a:solidFill>
+                    <a:schemeClr val="bg2"/>
+                  </a:solidFill>
+                </a:ln>
+              </a:rPr>
+              <a:t>)				5sec</a:t>
+            </a:r>
+          </a:p>
+          <a:p>
+            <a:pPr>
+              <a:buFont typeface="Wingdings" pitchFamily="2" charset="2"/>
+              <a:buChar char="v"/>
+            </a:pPr>
+            <a:r>
+              <a:rPr lang="fr-FR" sz="2400" dirty="0" smtClean="0">
+                <a:ln>
+                  <a:solidFill>
+                    <a:schemeClr val="bg2"/>
+                  </a:solidFill>
+                </a:ln>
+              </a:rPr>
+              <a:t>$lux(lux)				10sec</a:t>
+            </a:r>
+          </a:p>
+          <a:p>
+            <a:pPr>
+              <a:buFont typeface="Wingdings" pitchFamily="2" charset="2"/>
+              <a:buChar char="v"/>
+            </a:pPr>
+            <a:r>
+              <a:rPr lang="fr-FR" sz="2400" dirty="0" smtClean="0">
+                <a:ln>
+                  <a:solidFill>
+                    <a:schemeClr val="bg2"/>
+                  </a:solidFill>
+                </a:ln>
+              </a:rPr>
+              <a:t>$tem(c°) 				5sec</a:t>
+            </a:r>
+          </a:p>
+          <a:p>
+            <a:pPr>
+              <a:buFont typeface="Wingdings" pitchFamily="2" charset="2"/>
+              <a:buChar char="v"/>
+            </a:pPr>
+            <a:r>
+              <a:rPr lang="fr-FR" sz="2400" dirty="0" smtClean="0">
+                <a:ln>
+                  <a:solidFill>
+                    <a:schemeClr val="bg2"/>
+                  </a:solidFill>
+                </a:ln>
+              </a:rPr>
+              <a:t>$hum(%) 				5sec</a:t>
+            </a:r>
+          </a:p>
+          <a:p>
+            <a:pPr>
+              <a:buFont typeface="Wingdings" pitchFamily="2" charset="2"/>
+              <a:buChar char="v"/>
+            </a:pPr>
+            <a:r>
+              <a:rPr lang="fr-FR" sz="2400" dirty="0" smtClean="0">
+                <a:ln>
+                  <a:solidFill>
+                    <a:schemeClr val="bg2"/>
+                  </a:solidFill>
+                </a:ln>
+              </a:rPr>
+              <a:t>$con(w)			(impulsion du compteur)</a:t>
+            </a:r>
+          </a:p>
+          <a:p>
+            <a:pPr>
+              <a:buFont typeface="Wingdings" pitchFamily="2" charset="2"/>
+              <a:buChar char="v"/>
+            </a:pPr>
+            <a:r>
+              <a:rPr lang="fr-FR" sz="2400" dirty="0" smtClean="0">
+                <a:ln>
+                  <a:solidFill>
+                    <a:schemeClr val="bg2"/>
+                  </a:solidFill>
+                </a:ln>
+              </a:rPr>
+              <a:t>$air(1-10) 				10sec</a:t>
+            </a:r>
+          </a:p>
+          <a:p>
+            <a:pPr>
+              <a:buFont typeface="Wingdings" pitchFamily="2" charset="2"/>
+              <a:buChar char="v"/>
+            </a:pPr>
+            <a:r>
+              <a:rPr lang="fr-FR" sz="2400" dirty="0" smtClean="0">
+                <a:ln>
+                  <a:solidFill>
+                    <a:schemeClr val="bg2"/>
+                  </a:solidFill>
+                </a:ln>
+              </a:rPr>
+              <a:t>$heu(</a:t>
+            </a:r>
+            <a:r>
+              <a:rPr lang="fr-FR" sz="2400" dirty="0" err="1" smtClean="0">
+                <a:ln>
+                  <a:solidFill>
+                    <a:schemeClr val="bg2"/>
+                  </a:solidFill>
+                </a:ln>
+              </a:rPr>
+              <a:t>hh</a:t>
+            </a:r>
+            <a:r>
+              <a:rPr lang="fr-FR" sz="2400" dirty="0" smtClean="0">
+                <a:ln>
+                  <a:solidFill>
+                    <a:schemeClr val="bg2"/>
+                  </a:solidFill>
+                </a:ln>
+              </a:rPr>
+              <a:t>/mm/</a:t>
+            </a:r>
+            <a:r>
+              <a:rPr lang="fr-FR" sz="2400" dirty="0" err="1" smtClean="0">
+                <a:ln>
+                  <a:solidFill>
+                    <a:schemeClr val="bg2"/>
+                  </a:solidFill>
+                </a:ln>
+              </a:rPr>
+              <a:t>ss</a:t>
+            </a:r>
+            <a:r>
+              <a:rPr lang="fr-FR" sz="2400" dirty="0" smtClean="0">
+                <a:ln>
+                  <a:solidFill>
+                    <a:schemeClr val="bg2"/>
+                  </a:solidFill>
+                </a:ln>
+              </a:rPr>
+              <a:t>)		(impulsion du compteur</a:t>
+            </a:r>
+            <a:r>
+              <a:rPr lang="fr-FR" dirty="0" smtClean="0">
+                <a:ln>
+                  <a:solidFill>
+                    <a:schemeClr val="bg2"/>
+                  </a:solidFill>
+                </a:ln>
+              </a:rPr>
+              <a:t>)</a:t>
+            </a:r>
+            <a:endParaRPr lang="fr-FR" dirty="0">
+              <a:ln>
+                <a:solidFill>
+                  <a:schemeClr val="bg2"/>
+                </a:solidFill>
+              </a:ln>
+            </a:endParaRPr>
+          </a:p>
+        </p:txBody>
+      </p:sp>
+      <p:pic>
+        <p:nvPicPr>
+          <p:cNvPr id="1026" name="Picture 2" descr="Q:\Projet_Domotique_GITBTS\Rapport\img\bluetooth-670069_640.png"/>
+          <p:cNvPicPr>
+            <a:picLocks noChangeAspect="1" noChangeArrowheads="1"/>
+          </p:cNvPicPr>
+          <p:nvPr/>
+        </p:nvPicPr>
+        <p:blipFill>
+          <a:blip r:embed="rId2" cstate="print"/>
+          <a:srcRect/>
+          <a:stretch>
+            <a:fillRect/>
+          </a:stretch>
+        </p:blipFill>
+        <p:spPr bwMode="auto">
+          <a:xfrm>
+            <a:off x="6858016" y="785794"/>
+            <a:ext cx="1071570" cy="1636765"/>
+          </a:xfrm>
+          <a:prstGeom prst="rect">
+            <a:avLst/>
+          </a:prstGeom>
+          <a:noFill/>
+        </p:spPr>
+      </p:pic>
+    </p:spTree>
+  </p:cSld>
+  <p:clrMapOvr>
+    <a:masterClrMapping/>
+  </p:clrMapOvr>
+</p:sld>
+</file>
+
+<file path=ppt/slides/slide13.xml><?xml version="1.0" encoding="utf-8"?>
+<p:sld xmlns:a="http://schemas.openxmlformats.org/drawingml/2006/main" xmlns:r="http://schemas.openxmlformats.org/officeDocument/2006/relationships" xmlns:p="http://schemas.openxmlformats.org/presentationml/2006/main">
+  <p:cSld>
+    <p:spTree>
+      <p:nvGrpSpPr>
+        <p:cNvPr id="1" name=""/>
+        <p:cNvGrpSpPr/>
+        <p:nvPr/>
+      </p:nvGrpSpPr>
+      <p:grpSpPr>
+        <a:xfrm>
+          <a:off x="0" y="0"/>
+          <a:ext cx="0" cy="0"/>
+          <a:chOff x="0" y="0"/>
+          <a:chExt cx="0" cy="0"/>
+        </a:xfrm>
+      </p:grpSpPr>
+      <p:sp>
+        <p:nvSpPr>
+          <p:cNvPr id="2" name="Titre 1"/>
+          <p:cNvSpPr>
+            <a:spLocks noGrp="1"/>
+          </p:cNvSpPr>
+          <p:nvPr>
+            <p:ph type="title"/>
+          </p:nvPr>
+        </p:nvSpPr>
+        <p:spPr/>
+        <p:txBody>
+          <a:bodyPr/>
+          <a:lstStyle/>
+          <a:p>
+            <a:r>
+              <a:rPr lang="fr-FR" dirty="0" smtClean="0"/>
+              <a:t>Schéma de l’application </a:t>
+            </a:r>
+            <a:endParaRPr lang="fr-FR" dirty="0"/>
+          </a:p>
+        </p:txBody>
+      </p:sp>
+      <p:pic>
+        <p:nvPicPr>
+          <p:cNvPr id="5" name="Image 4" descr="Shema_organisation_simplifier.png"/>
+          <p:cNvPicPr>
+            <a:picLocks noChangeAspect="1"/>
+          </p:cNvPicPr>
+          <p:nvPr/>
+        </p:nvPicPr>
+        <p:blipFill>
+          <a:blip r:embed="rId2"/>
+          <a:stretch>
+            <a:fillRect/>
+          </a:stretch>
+        </p:blipFill>
+        <p:spPr>
+          <a:xfrm>
+            <a:off x="1643042" y="1428736"/>
+            <a:ext cx="5843599" cy="4770285"/>
+          </a:xfrm>
+          <a:prstGeom prst="rect">
+            <a:avLst/>
+          </a:prstGeom>
+        </p:spPr>
+      </p:pic>
+    </p:spTree>
+  </p:cSld>
+  <p:clrMapOvr>
+    <a:masterClrMapping/>
+  </p:clrMapOvr>
+</p:sld>
+</file>
+
 <file path=ppt/slides/slide2.xml><?xml version="1.0" encoding="utf-8"?>
 <p:sld xmlns:a="http://schemas.openxmlformats.org/drawingml/2006/main" xmlns:r="http://schemas.openxmlformats.org/officeDocument/2006/relationships" xmlns:p="http://schemas.openxmlformats.org/presentationml/2006/main">
   <p:cSld>
@@ -4818,29 +5555,87 @@
           <a:bodyPr/>
           <a:lstStyle/>
           <a:p>
-            <a:endParaRPr lang="fr-FR"/>
-          </a:p>
-        </p:txBody>
-      </p:sp>
-      <p:sp>
-        <p:nvSpPr>
-          <p:cNvPr id="3" name="Espace réservé du contenu 2"/>
-          <p:cNvSpPr>
-            <a:spLocks noGrp="1"/>
-          </p:cNvSpPr>
-          <p:nvPr>
-            <p:ph idx="1"/>
-          </p:nvPr>
-        </p:nvSpPr>
-        <p:spPr/>
-        <p:txBody>
-          <a:bodyPr/>
-          <a:lstStyle/>
-          <a:p>
-            <a:endParaRPr lang="fr-FR"/>
-          </a:p>
-        </p:txBody>
-      </p:sp>
+            <a:r>
+              <a:rPr lang="fr-FR" dirty="0" smtClean="0">
+                <a:ln w="18415" cmpd="sng">
+                  <a:solidFill>
+                    <a:srgbClr val="FFFFFF"/>
+                  </a:solidFill>
+                  <a:prstDash val="solid"/>
+                </a:ln>
+                <a:solidFill>
+                  <a:srgbClr val="FFFFFF"/>
+                </a:solidFill>
+                <a:effectLst>
+                  <a:outerShdw blurRad="63500" dir="3600000" algn="tl" rotWithShape="0">
+                    <a:srgbClr val="000000">
+                      <a:alpha val="70000"/>
+                    </a:srgbClr>
+                  </a:outerShdw>
+                </a:effectLst>
+              </a:rPr>
+              <a:t>Scénario d’alerte sécurité </a:t>
+            </a:r>
+            <a:endParaRPr lang="fr-FR" dirty="0">
+              <a:ln w="18415" cmpd="sng">
+                <a:solidFill>
+                  <a:srgbClr val="FFFFFF"/>
+                </a:solidFill>
+                <a:prstDash val="solid"/>
+              </a:ln>
+              <a:solidFill>
+                <a:srgbClr val="FFFFFF"/>
+              </a:solidFill>
+              <a:effectLst>
+                <a:outerShdw blurRad="63500" dir="3600000" algn="tl" rotWithShape="0">
+                  <a:srgbClr val="000000">
+                    <a:alpha val="70000"/>
+                  </a:srgbClr>
+                </a:outerShdw>
+              </a:effectLst>
+            </a:endParaRPr>
+          </a:p>
+        </p:txBody>
+      </p:sp>
+      <p:pic>
+        <p:nvPicPr>
+          <p:cNvPr id="2050" name="Picture 2"/>
+          <p:cNvPicPr>
+            <a:picLocks noChangeAspect="1" noChangeArrowheads="1"/>
+          </p:cNvPicPr>
+          <p:nvPr/>
+        </p:nvPicPr>
+        <p:blipFill>
+          <a:blip r:embed="rId2"/>
+          <a:srcRect/>
+          <a:stretch>
+            <a:fillRect/>
+          </a:stretch>
+        </p:blipFill>
+        <p:spPr bwMode="auto">
+          <a:xfrm>
+            <a:off x="959181" y="1500174"/>
+            <a:ext cx="7225638" cy="5010162"/>
+          </a:xfrm>
+          <a:prstGeom prst="rect">
+            <a:avLst/>
+          </a:prstGeom>
+          <a:ln w="38100" cap="sq">
+            <a:solidFill>
+              <a:schemeClr val="accent2"/>
+            </a:solidFill>
+            <a:prstDash val="solid"/>
+            <a:miter lim="800000"/>
+          </a:ln>
+          <a:effectLst>
+            <a:outerShdw blurRad="50800" dist="38100" dir="2700000" algn="tl" rotWithShape="0">
+              <a:srgbClr val="000000">
+                <a:alpha val="43000"/>
+              </a:srgbClr>
+            </a:outerShdw>
+          </a:effectLst>
+        </p:spPr>
+      </p:pic>
     </p:spTree>
   </p:cSld>
   <p:clrMapOvr>

</xml_diff>